<commit_message>
doc: logo size changed
</commit_message>
<xml_diff>
--- a/assets/imgs/CostKo_logo.pptx
+++ b/assets/imgs/CostKo_logo.pptx
@@ -104,6 +104,11 @@
       </a:defRPr>
     </a:lvl9pPr>
   </p:defaultTextStyle>
+  <p:extLst>
+    <p:ext uri="{EFAFB233-063F-42B5-8137-9DF3F51BA10A}">
+      <p15:sldGuideLst xmlns:p15="http://schemas.microsoft.com/office/powerpoint/2012/main"/>
+    </p:ext>
+  </p:extLst>
 </p:presentation>
 </file>
 
@@ -3345,7 +3350,7 @@
         </p:nvSpPr>
         <p:spPr>
           <a:xfrm>
-            <a:off x="2483197" y="1353741"/>
+            <a:off x="1800365" y="1195377"/>
             <a:ext cx="9144000" cy="2387600"/>
           </a:xfrm>
         </p:spPr>
@@ -3391,7 +3396,7 @@
         </p:nvSpPr>
         <p:spPr>
           <a:xfrm>
-            <a:off x="2483197" y="3481386"/>
+            <a:off x="1883493" y="3332944"/>
             <a:ext cx="9144000" cy="1655762"/>
           </a:xfrm>
         </p:spPr>
@@ -3435,7 +3440,7 @@
         </p:nvGrpSpPr>
         <p:grpSpPr>
           <a:xfrm>
-            <a:off x="3344099" y="3562349"/>
+            <a:off x="2744395" y="3413907"/>
             <a:ext cx="1106488" cy="263527"/>
             <a:chOff x="3355975" y="3562349"/>
             <a:chExt cx="1106488" cy="263527"/>
@@ -3612,7 +3617,7 @@
         </p:nvGrpSpPr>
         <p:grpSpPr>
           <a:xfrm>
-            <a:off x="9756775" y="3562349"/>
+            <a:off x="9157071" y="3413907"/>
             <a:ext cx="1106488" cy="263527"/>
             <a:chOff x="3355975" y="3562349"/>
             <a:chExt cx="1106488" cy="263527"/>

</xml_diff>